<commit_message>
added time discussion slide
added slide with plots of time dependencies
</commit_message>
<xml_diff>
--- a/Percolation/Percolation_Presentation.pptx
+++ b/Percolation/Percolation_Presentation.pptx
@@ -236,7 +236,7 @@
           <a:p>
             <a:fld id="{BEA74EB7-856E-45FD-83F0-5F7C6F3E4372}" type="datetimeFigureOut">
               <a:rPr lang="en-US"/>
-              <a:t>4/13/17</a:t>
+              <a:t>4/13/2017</a:t>
             </a:fld>
             <a:endParaRPr/>
           </a:p>
@@ -401,7 +401,7 @@
           <a:p>
             <a:fld id="{C61B0E40-8125-41F8-BB6C-139D8D531A4F}" type="datetimeFigureOut">
               <a:rPr lang="en-US"/>
-              <a:t>4/13/17</a:t>
+              <a:t>4/13/2017</a:t>
             </a:fld>
             <a:endParaRPr/>
           </a:p>
@@ -1218,7 +1218,7 @@
             <a:fld id="{8E36636D-D922-432D-A958-524484B5923D}" type="datetimeFigureOut">
               <a:rPr lang="en-US"/>
               <a:pPr/>
-              <a:t>4/13/17</a:t>
+              <a:t>4/13/2017</a:t>
             </a:fld>
             <a:endParaRPr/>
           </a:p>
@@ -1418,7 +1418,7 @@
             <a:fld id="{8E36636D-D922-432D-A958-524484B5923D}" type="datetimeFigureOut">
               <a:rPr lang="en-US"/>
               <a:pPr/>
-              <a:t>4/13/17</a:t>
+              <a:t>4/13/2017</a:t>
             </a:fld>
             <a:endParaRPr/>
           </a:p>
@@ -1628,7 +1628,7 @@
             <a:fld id="{8E36636D-D922-432D-A958-524484B5923D}" type="datetimeFigureOut">
               <a:rPr lang="en-US"/>
               <a:pPr/>
-              <a:t>4/13/17</a:t>
+              <a:t>4/13/2017</a:t>
             </a:fld>
             <a:endParaRPr/>
           </a:p>
@@ -1818,7 +1818,7 @@
             <a:fld id="{8E36636D-D922-432D-A958-524484B5923D}" type="datetimeFigureOut">
               <a:rPr lang="en-US"/>
               <a:pPr/>
-              <a:t>4/13/17</a:t>
+              <a:t>4/13/2017</a:t>
             </a:fld>
             <a:endParaRPr/>
           </a:p>
@@ -2091,7 +2091,7 @@
             <a:fld id="{8E36636D-D922-432D-A958-524484B5923D}" type="datetimeFigureOut">
               <a:rPr lang="en-US"/>
               <a:pPr/>
-              <a:t>4/13/17</a:t>
+              <a:t>4/13/2017</a:t>
             </a:fld>
             <a:endParaRPr/>
           </a:p>
@@ -2413,7 +2413,7 @@
             <a:fld id="{8E36636D-D922-432D-A958-524484B5923D}" type="datetimeFigureOut">
               <a:rPr lang="en-US"/>
               <a:pPr/>
-              <a:t>4/13/17</a:t>
+              <a:t>4/13/2017</a:t>
             </a:fld>
             <a:endParaRPr/>
           </a:p>
@@ -2863,7 +2863,7 @@
             <a:fld id="{8E36636D-D922-432D-A958-524484B5923D}" type="datetimeFigureOut">
               <a:rPr lang="en-US"/>
               <a:pPr/>
-              <a:t>4/13/17</a:t>
+              <a:t>4/13/2017</a:t>
             </a:fld>
             <a:endParaRPr/>
           </a:p>
@@ -2995,7 +2995,7 @@
             <a:fld id="{8E36636D-D922-432D-A958-524484B5923D}" type="datetimeFigureOut">
               <a:rPr lang="en-US"/>
               <a:pPr/>
-              <a:t>4/13/17</a:t>
+              <a:t>4/13/2017</a:t>
             </a:fld>
             <a:endParaRPr/>
           </a:p>
@@ -3257,7 +3257,7 @@
             <a:fld id="{8E36636D-D922-432D-A958-524484B5923D}" type="datetimeFigureOut">
               <a:rPr lang="en-US"/>
               <a:pPr/>
-              <a:t>4/13/17</a:t>
+              <a:t>4/13/2017</a:t>
             </a:fld>
             <a:endParaRPr/>
           </a:p>
@@ -3604,7 +3604,7 @@
             <a:fld id="{8E36636D-D922-432D-A958-524484B5923D}" type="datetimeFigureOut">
               <a:rPr lang="en-US"/>
               <a:pPr/>
-              <a:t>4/13/17</a:t>
+              <a:t>4/13/2017</a:t>
             </a:fld>
             <a:endParaRPr/>
           </a:p>
@@ -3939,7 +3939,7 @@
             <a:fld id="{8E36636D-D922-432D-A958-524484B5923D}" type="datetimeFigureOut">
               <a:rPr lang="en-US"/>
               <a:pPr/>
-              <a:t>4/13/17</a:t>
+              <a:t>4/13/2017</a:t>
             </a:fld>
             <a:endParaRPr/>
           </a:p>
@@ -4470,7 +4470,7 @@
             <a:fld id="{8E36636D-D922-432D-A958-524484B5923D}" type="datetimeFigureOut">
               <a:rPr lang="en-US"/>
               <a:pPr/>
-              <a:t>4/13/17</a:t>
+              <a:t>4/13/2017</a:t>
             </a:fld>
             <a:endParaRPr/>
           </a:p>
@@ -5010,13 +5010,6 @@
       </p:transition>
     </mc:Fallback>
   </mc:AlternateContent>
-  <p:timing>
-    <p:tnLst>
-      <p:par>
-        <p:cTn id="1" dur="indefinite" restart="never" nodeType="tmRoot"/>
-      </p:par>
-    </p:tnLst>
-  </p:timing>
 </p:sld>
 </file>
 
@@ -5081,13 +5074,6 @@
       </p:transition>
     </mc:Fallback>
   </mc:AlternateContent>
-  <p:timing>
-    <p:tnLst>
-      <p:par>
-        <p:cTn id="1" dur="indefinite" restart="never" nodeType="tmRoot"/>
-      </p:par>
-    </p:tnLst>
-  </p:timing>
 </p:sld>
 </file>
 
@@ -5129,7 +5115,7 @@
           <a:lstStyle/>
           <a:p>
             <a:r>
-              <a:rPr lang="en-US" smtClean="0"/>
+              <a:rPr lang="en-US"/>
               <a:t>Critical Exponent</a:t>
             </a:r>
             <a:endParaRPr lang="en-US" dirty="0"/>
@@ -5184,8 +5170,8 @@
           </a:prstGeom>
         </p:spPr>
       </p:pic>
-      <mc:AlternateContent xmlns:mc="http://schemas.openxmlformats.org/markup-compatibility/2006">
-        <mc:Choice xmlns:a14="http://schemas.microsoft.com/office/drawing/2010/main" Requires="a14">
+      <mc:AlternateContent xmlns:mc="http://schemas.openxmlformats.org/markup-compatibility/2006" xmlns:a14="http://schemas.microsoft.com/office/drawing/2010/main">
+        <mc:Choice Requires="a14">
           <p:sp>
             <p:nvSpPr>
               <p:cNvPr id="13" name="TextBox 12"/>
@@ -5214,11 +5200,11 @@
                   </a:lnSpc>
                 </a:pPr>
                 <a:r>
-                  <a:rPr lang="en-US" sz="2400" b="1" dirty="0" smtClean="0"/>
+                  <a:rPr lang="en-US" sz="2400" b="1" dirty="0"/>
                   <a:t>Theoretical</a:t>
                 </a:r>
                 <a:r>
-                  <a:rPr lang="en-US" sz="2400" dirty="0" smtClean="0"/>
+                  <a:rPr lang="en-US" sz="2400" dirty="0"/>
                   <a:t> </a:t>
                 </a:r>
                 <a14:m>
@@ -5246,7 +5232,7 @@
             </p:txBody>
           </p:sp>
         </mc:Choice>
-        <mc:Fallback>
+        <mc:Fallback xmlns="">
           <p:sp>
             <p:nvSpPr>
               <p:cNvPr id="13" name="TextBox 12"/>
@@ -5285,8 +5271,8 @@
           </p:sp>
         </mc:Fallback>
       </mc:AlternateContent>
-      <mc:AlternateContent xmlns:mc="http://schemas.openxmlformats.org/markup-compatibility/2006">
-        <mc:Choice xmlns:a14="http://schemas.microsoft.com/office/drawing/2010/main" Requires="a14">
+      <mc:AlternateContent xmlns:mc="http://schemas.openxmlformats.org/markup-compatibility/2006" xmlns:a14="http://schemas.microsoft.com/office/drawing/2010/main">
+        <mc:Choice Requires="a14">
           <p:sp>
             <p:nvSpPr>
               <p:cNvPr id="14" name="TextBox 13"/>
@@ -5325,7 +5311,7 @@
                           <m:type m:val="skw"/>
                           <m:ctrlPr>
                             <a:rPr lang="en-US" sz="2400" i="1" smtClean="0">
-                              <a:latin typeface="Cambria Math" charset="0"/>
+                              <a:latin typeface="Cambria Math" panose="02040503050406030204" pitchFamily="18" charset="0"/>
                             </a:rPr>
                           </m:ctrlPr>
                         </m:fPr>
@@ -5370,7 +5356,7 @@
             </p:txBody>
           </p:sp>
         </mc:Choice>
-        <mc:Fallback>
+        <mc:Fallback xmlns="">
           <p:sp>
             <p:nvSpPr>
               <p:cNvPr id="14" name="TextBox 13"/>
@@ -5437,14 +5423,13 @@
               </a:lnSpc>
             </a:pPr>
             <a:r>
-              <a:rPr lang="en-US" sz="2400" b="1" dirty="0" smtClean="0"/>
+              <a:rPr lang="en-US" sz="2400" b="1" dirty="0"/>
               <a:t>Our results</a:t>
             </a:r>
             <a:r>
-              <a:rPr lang="en-US" sz="2400" dirty="0" smtClean="0"/>
+              <a:rPr lang="en-US" sz="2400" dirty="0"/>
               <a:t>:</a:t>
             </a:r>
-            <a:endParaRPr lang="en-US" sz="2400" dirty="0"/>
           </a:p>
         </p:txBody>
       </p:sp>
@@ -5476,7 +5461,7 @@
               </a:lnSpc>
             </a:pPr>
             <a:r>
-              <a:rPr lang="en-US" sz="2400" dirty="0" smtClean="0"/>
+              <a:rPr lang="en-US" sz="2400" dirty="0"/>
               <a:t>0.1383</a:t>
             </a:r>
           </a:p>
@@ -5487,7 +5472,7 @@
               </a:lnSpc>
             </a:pPr>
             <a:r>
-              <a:rPr lang="en-US" sz="2400" dirty="0" smtClean="0"/>
+              <a:rPr lang="en-US" sz="2400" dirty="0"/>
               <a:t>0.1094</a:t>
             </a:r>
           </a:p>
@@ -5498,7 +5483,7 @@
               </a:lnSpc>
             </a:pPr>
             <a:r>
-              <a:rPr lang="en-US" sz="2400" dirty="0" smtClean="0"/>
+              <a:rPr lang="en-US" sz="2400" dirty="0"/>
               <a:t>0.1232</a:t>
             </a:r>
           </a:p>
@@ -5564,13 +5549,6 @@
       </p:transition>
     </mc:Fallback>
   </mc:AlternateContent>
-  <p:timing>
-    <p:tnLst>
-      <p:par>
-        <p:cTn id="1" dur="indefinite" restart="never" nodeType="tmRoot"/>
-      </p:par>
-    </p:tnLst>
-  </p:timing>
 </p:sld>
 </file>
 
@@ -5677,13 +5655,6 @@
       </p:transition>
     </mc:Fallback>
   </mc:AlternateContent>
-  <p:timing>
-    <p:tnLst>
-      <p:par>
-        <p:cTn id="1" dur="indefinite" restart="never" nodeType="tmRoot"/>
-      </p:par>
-    </p:tnLst>
-  </p:timing>
 </p:sld>
 </file>
 
@@ -5782,13 +5753,6 @@
       </p:transition>
     </mc:Fallback>
   </mc:AlternateContent>
-  <p:timing>
-    <p:tnLst>
-      <p:par>
-        <p:cTn id="1" dur="indefinite" restart="never" nodeType="tmRoot"/>
-      </p:par>
-    </p:tnLst>
-  </p:timing>
 </p:sld>
 </file>
 
@@ -5853,13 +5817,6 @@
       </p:transition>
     </mc:Fallback>
   </mc:AlternateContent>
-  <p:timing>
-    <p:tnLst>
-      <p:par>
-        <p:cTn id="1" dur="indefinite" restart="never" nodeType="tmRoot"/>
-      </p:par>
-    </p:tnLst>
-  </p:timing>
 </p:sld>
 </file>
 
@@ -5920,7 +5877,7 @@
         </p:spPr>
         <p:txBody>
           <a:bodyPr>
-            <a:normAutofit lnSpcReduction="10000"/>
+            <a:normAutofit/>
           </a:bodyPr>
           <a:lstStyle/>
           <a:p>
@@ -6242,13 +6199,6 @@
       </p:transition>
     </mc:Fallback>
   </mc:AlternateContent>
-  <p:timing>
-    <p:tnLst>
-      <p:par>
-        <p:cTn id="1" dur="indefinite" restart="never" nodeType="tmRoot"/>
-      </p:par>
-    </p:tnLst>
-  </p:timing>
 </p:sld>
 </file>
 
@@ -6281,8 +6231,8 @@
         </p:nvSpPr>
         <p:spPr>
           <a:xfrm>
-            <a:off x="1375026" y="-1104901"/>
-            <a:ext cx="4498975" cy="2057400"/>
+            <a:off x="1375026" y="380999"/>
+            <a:ext cx="4498975" cy="571499"/>
           </a:xfrm>
         </p:spPr>
         <p:txBody>
@@ -6424,253 +6374,6 @@
       </p:pic>
       <p:sp>
         <p:nvSpPr>
-          <p:cNvPr id="8" name="Text Placeholder 4"/>
-          <p:cNvSpPr txBox="1">
-            <a:spLocks/>
-          </p:cNvSpPr>
-          <p:nvPr/>
-        </p:nvSpPr>
-        <p:spPr>
-          <a:xfrm>
-            <a:off x="6631238" y="1461090"/>
-            <a:ext cx="4876801" cy="685801"/>
-          </a:xfrm>
-          <a:prstGeom prst="rect">
-            <a:avLst/>
-          </a:prstGeom>
-        </p:spPr>
-        <p:txBody>
-          <a:bodyPr/>
-          <a:lstStyle>
-            <a:lvl1pPr marL="274320" indent="-274320" algn="l" defTabSz="914400" rtl="0" eaLnBrk="1" latinLnBrk="0" hangingPunct="1">
-              <a:lnSpc>
-                <a:spcPct val="90000"/>
-              </a:lnSpc>
-              <a:spcBef>
-                <a:spcPts val="1800"/>
-              </a:spcBef>
-              <a:buClr>
-                <a:schemeClr val="tx1"/>
-              </a:buClr>
-              <a:buSzPct val="100000"/>
-              <a:buFont typeface="Arial" pitchFamily="34" charset="0"/>
-              <a:buChar char="▪"/>
-              <a:defRPr sz="2400" kern="1200">
-                <a:solidFill>
-                  <a:schemeClr val="tx1"/>
-                </a:solidFill>
-                <a:latin typeface="+mn-lt"/>
-                <a:ea typeface="+mn-ea"/>
-                <a:cs typeface="+mn-cs"/>
-              </a:defRPr>
-            </a:lvl1pPr>
-            <a:lvl2pPr marL="548640" indent="-228600" algn="l" defTabSz="914400" rtl="0" eaLnBrk="1" latinLnBrk="0" hangingPunct="1">
-              <a:lnSpc>
-                <a:spcPct val="90000"/>
-              </a:lnSpc>
-              <a:spcBef>
-                <a:spcPts val="1000"/>
-              </a:spcBef>
-              <a:buClr>
-                <a:schemeClr val="tx1"/>
-              </a:buClr>
-              <a:buSzPct val="100000"/>
-              <a:buFont typeface="Arial" pitchFamily="34" charset="0"/>
-              <a:buChar char="–"/>
-              <a:defRPr sz="2000" kern="1200">
-                <a:solidFill>
-                  <a:schemeClr val="tx1"/>
-                </a:solidFill>
-                <a:latin typeface="+mn-lt"/>
-                <a:ea typeface="+mn-ea"/>
-                <a:cs typeface="+mn-cs"/>
-              </a:defRPr>
-            </a:lvl2pPr>
-            <a:lvl3pPr marL="822960" indent="-228600" algn="l" defTabSz="914400" rtl="0" eaLnBrk="1" latinLnBrk="0" hangingPunct="1">
-              <a:lnSpc>
-                <a:spcPct val="90000"/>
-              </a:lnSpc>
-              <a:spcBef>
-                <a:spcPts val="800"/>
-              </a:spcBef>
-              <a:buClr>
-                <a:schemeClr val="tx1"/>
-              </a:buClr>
-              <a:buSzPct val="100000"/>
-              <a:buFont typeface="Arial" pitchFamily="34" charset="0"/>
-              <a:buChar char="▪"/>
-              <a:defRPr sz="1800" kern="1200">
-                <a:solidFill>
-                  <a:schemeClr val="tx1"/>
-                </a:solidFill>
-                <a:latin typeface="+mn-lt"/>
-                <a:ea typeface="+mn-ea"/>
-                <a:cs typeface="+mn-cs"/>
-              </a:defRPr>
-            </a:lvl3pPr>
-            <a:lvl4pPr marL="1097280" indent="-228600" algn="l" defTabSz="914400" rtl="0" eaLnBrk="1" latinLnBrk="0" hangingPunct="1">
-              <a:lnSpc>
-                <a:spcPct val="90000"/>
-              </a:lnSpc>
-              <a:spcBef>
-                <a:spcPts val="800"/>
-              </a:spcBef>
-              <a:buClr>
-                <a:schemeClr val="tx1"/>
-              </a:buClr>
-              <a:buSzPct val="100000"/>
-              <a:buFont typeface="Arial" pitchFamily="34" charset="0"/>
-              <a:buChar char="–"/>
-              <a:defRPr sz="1600" kern="1200">
-                <a:solidFill>
-                  <a:schemeClr val="tx1"/>
-                </a:solidFill>
-                <a:latin typeface="+mn-lt"/>
-                <a:ea typeface="+mn-ea"/>
-                <a:cs typeface="+mn-cs"/>
-              </a:defRPr>
-            </a:lvl4pPr>
-            <a:lvl5pPr marL="1325880" indent="-228600" algn="l" defTabSz="914400" rtl="0" eaLnBrk="1" latinLnBrk="0" hangingPunct="1">
-              <a:lnSpc>
-                <a:spcPct val="90000"/>
-              </a:lnSpc>
-              <a:spcBef>
-                <a:spcPts val="800"/>
-              </a:spcBef>
-              <a:buClr>
-                <a:schemeClr val="tx1"/>
-              </a:buClr>
-              <a:buSzPct val="100000"/>
-              <a:buFont typeface="Arial" pitchFamily="34" charset="0"/>
-              <a:buChar char="▪"/>
-              <a:defRPr sz="1600" kern="1200">
-                <a:solidFill>
-                  <a:schemeClr val="tx1"/>
-                </a:solidFill>
-                <a:latin typeface="+mn-lt"/>
-                <a:ea typeface="+mn-ea"/>
-                <a:cs typeface="+mn-cs"/>
-              </a:defRPr>
-            </a:lvl5pPr>
-            <a:lvl6pPr marL="1554480" indent="-228600" algn="l" defTabSz="914400" rtl="0" eaLnBrk="1" latinLnBrk="0" hangingPunct="1">
-              <a:lnSpc>
-                <a:spcPct val="90000"/>
-              </a:lnSpc>
-              <a:spcBef>
-                <a:spcPts val="800"/>
-              </a:spcBef>
-              <a:buClr>
-                <a:schemeClr val="tx1"/>
-              </a:buClr>
-              <a:buSzPct val="100000"/>
-              <a:buFont typeface="Arial" pitchFamily="34" charset="0"/>
-              <a:buChar char="–"/>
-              <a:defRPr sz="1600" kern="1200">
-                <a:solidFill>
-                  <a:schemeClr val="tx1"/>
-                </a:solidFill>
-                <a:latin typeface="+mn-lt"/>
-                <a:ea typeface="+mn-ea"/>
-                <a:cs typeface="+mn-cs"/>
-              </a:defRPr>
-            </a:lvl6pPr>
-            <a:lvl7pPr marL="1783080" indent="-228600" algn="l" defTabSz="914400" rtl="0" eaLnBrk="1" latinLnBrk="0" hangingPunct="1">
-              <a:lnSpc>
-                <a:spcPct val="90000"/>
-              </a:lnSpc>
-              <a:spcBef>
-                <a:spcPts val="800"/>
-              </a:spcBef>
-              <a:buClr>
-                <a:schemeClr val="tx1"/>
-              </a:buClr>
-              <a:buSzPct val="100000"/>
-              <a:buFont typeface="Arial" pitchFamily="34" charset="0"/>
-              <a:buChar char="▪"/>
-              <a:defRPr sz="1600" kern="1200">
-                <a:solidFill>
-                  <a:schemeClr val="tx1"/>
-                </a:solidFill>
-                <a:latin typeface="+mn-lt"/>
-                <a:ea typeface="+mn-ea"/>
-                <a:cs typeface="+mn-cs"/>
-              </a:defRPr>
-            </a:lvl7pPr>
-            <a:lvl8pPr marL="2011680" indent="-228600" algn="l" defTabSz="914400" rtl="0" eaLnBrk="1" latinLnBrk="0" hangingPunct="1">
-              <a:lnSpc>
-                <a:spcPct val="90000"/>
-              </a:lnSpc>
-              <a:spcBef>
-                <a:spcPts val="800"/>
-              </a:spcBef>
-              <a:buClr>
-                <a:schemeClr val="tx1"/>
-              </a:buClr>
-              <a:buSzPct val="100000"/>
-              <a:buFont typeface="Arial" pitchFamily="34" charset="0"/>
-              <a:buChar char="–"/>
-              <a:defRPr sz="1600" kern="1200">
-                <a:solidFill>
-                  <a:schemeClr val="tx1"/>
-                </a:solidFill>
-                <a:latin typeface="+mn-lt"/>
-                <a:ea typeface="+mn-ea"/>
-                <a:cs typeface="+mn-cs"/>
-              </a:defRPr>
-            </a:lvl8pPr>
-            <a:lvl9pPr marL="2240280" indent="-228600" algn="l" defTabSz="914400" rtl="0" eaLnBrk="1" latinLnBrk="0" hangingPunct="1">
-              <a:lnSpc>
-                <a:spcPct val="90000"/>
-              </a:lnSpc>
-              <a:spcBef>
-                <a:spcPts val="800"/>
-              </a:spcBef>
-              <a:buClr>
-                <a:schemeClr val="tx1"/>
-              </a:buClr>
-              <a:buSzPct val="100000"/>
-              <a:buFont typeface="Arial" pitchFamily="34" charset="0"/>
-              <a:buChar char="▪"/>
-              <a:defRPr sz="1600" kern="1200">
-                <a:solidFill>
-                  <a:schemeClr val="tx1"/>
-                </a:solidFill>
-                <a:latin typeface="+mn-lt"/>
-                <a:ea typeface="+mn-ea"/>
-                <a:cs typeface="+mn-cs"/>
-              </a:defRPr>
-            </a:lvl9pPr>
-          </a:lstStyle>
-          <a:p>
-            <a:pPr marL="0" indent="0">
-              <a:buNone/>
-            </a:pPr>
-            <a:r>
-              <a:rPr lang="en-US" sz="3200" b="1" dirty="0" err="1" smtClean="0">
-                <a:solidFill>
-                  <a:srgbClr val="92D050"/>
-                </a:solidFill>
-              </a:rPr>
-              <a:t>Pseudocode</a:t>
-            </a:r>
-            <a:r>
-              <a:rPr lang="en-US" dirty="0" smtClean="0">
-                <a:solidFill>
-                  <a:srgbClr val="92D050"/>
-                </a:solidFill>
-              </a:rPr>
-              <a:t>:</a:t>
-            </a:r>
-            <a:endParaRPr lang="en-US" dirty="0">
-              <a:solidFill>
-                <a:srgbClr val="92D050"/>
-              </a:solidFill>
-            </a:endParaRPr>
-          </a:p>
-        </p:txBody>
-      </p:sp>
-      <p:sp>
-        <p:nvSpPr>
           <p:cNvPr id="9" name="TextBox 8"/>
           <p:cNvSpPr txBox="1"/>
           <p:nvPr/>
@@ -6740,6 +6443,54 @@
             <a:r>
               <a:rPr lang="en-US" sz="2400" dirty="0"/>
               <a:t>Repeat until the same cluster touches all sides</a:t>
+            </a:r>
+          </a:p>
+        </p:txBody>
+      </p:sp>
+      <p:sp>
+        <p:nvSpPr>
+          <p:cNvPr id="10" name="Title 1"/>
+          <p:cNvSpPr txBox="1">
+            <a:spLocks/>
+          </p:cNvSpPr>
+          <p:nvPr/>
+        </p:nvSpPr>
+        <p:spPr>
+          <a:xfrm>
+            <a:off x="6595980" y="1447800"/>
+            <a:ext cx="4498975" cy="571499"/>
+          </a:xfrm>
+          <a:prstGeom prst="rect">
+            <a:avLst/>
+          </a:prstGeom>
+        </p:spPr>
+        <p:txBody>
+          <a:bodyPr vert="horz" lIns="91440" tIns="45720" rIns="91440" bIns="45720" rtlCol="0" anchor="b">
+            <a:normAutofit/>
+          </a:bodyPr>
+          <a:lstStyle>
+            <a:lvl1pPr algn="l" defTabSz="914400" rtl="0" eaLnBrk="1" latinLnBrk="0" hangingPunct="1">
+              <a:lnSpc>
+                <a:spcPct val="90000"/>
+              </a:lnSpc>
+              <a:spcBef>
+                <a:spcPct val="0"/>
+              </a:spcBef>
+              <a:buNone/>
+              <a:defRPr sz="3200" kern="1200">
+                <a:solidFill>
+                  <a:schemeClr val="accent1"/>
+                </a:solidFill>
+                <a:latin typeface="+mj-lt"/>
+                <a:ea typeface="+mj-ea"/>
+                <a:cs typeface="+mj-cs"/>
+              </a:defRPr>
+            </a:lvl1pPr>
+          </a:lstStyle>
+          <a:p>
+            <a:r>
+              <a:rPr lang="en-US" dirty="0"/>
+              <a:t>Pseudocode</a:t>
             </a:r>
           </a:p>
         </p:txBody>
@@ -6766,13 +6517,6 @@
       </p:transition>
     </mc:Fallback>
   </mc:AlternateContent>
-  <p:timing>
-    <p:tnLst>
-      <p:par>
-        <p:cTn id="1" dur="indefinite" restart="never" nodeType="tmRoot"/>
-      </p:par>
-    </p:tnLst>
-  </p:timing>
 </p:sld>
 </file>
 
@@ -6803,43 +6547,83 @@
             <p:ph type="title"/>
           </p:nvPr>
         </p:nvSpPr>
-        <p:spPr/>
+        <p:spPr>
+          <a:xfrm>
+            <a:off x="760412" y="609600"/>
+            <a:ext cx="9906002" cy="1066800"/>
+          </a:xfrm>
+        </p:spPr>
         <p:txBody>
           <a:bodyPr/>
           <a:lstStyle/>
           <a:p>
             <a:r>
-              <a:rPr lang="en-US" dirty="0" smtClean="0"/>
-              <a:t>Time to run</a:t>
-            </a:r>
-            <a:endParaRPr lang="en-US" dirty="0"/>
-          </a:p>
-        </p:txBody>
-      </p:sp>
-      <p:sp>
-        <p:nvSpPr>
-          <p:cNvPr id="3" name="Content Placeholder 2"/>
-          <p:cNvSpPr>
-            <a:spLocks noGrp="1"/>
-          </p:cNvSpPr>
-          <p:nvPr>
-            <p:ph idx="1"/>
-          </p:nvPr>
-        </p:nvSpPr>
+              <a:rPr lang="en-US" dirty="0"/>
+              <a:t>Time to run – speed up</a:t>
+            </a:r>
+          </a:p>
+        </p:txBody>
+      </p:sp>
+      <p:pic>
+        <p:nvPicPr>
+          <p:cNvPr id="9" name="Picture 8"/>
+          <p:cNvPicPr>
+            <a:picLocks noChangeAspect="1"/>
+          </p:cNvPicPr>
+          <p:nvPr/>
+        </p:nvPicPr>
+        <p:blipFill>
+          <a:blip r:embed="rId2">
+            <a:extLst>
+              <a:ext uri="{28A0092B-C50C-407E-A947-70E740481C1C}">
+                <a14:useLocalDpi xmlns:a14="http://schemas.microsoft.com/office/drawing/2010/main" val="0"/>
+              </a:ext>
+            </a:extLst>
+          </a:blip>
+          <a:stretch>
+            <a:fillRect/>
+          </a:stretch>
+        </p:blipFill>
         <p:spPr>
           <a:xfrm>
-            <a:off x="1522876" y="2362200"/>
-            <a:ext cx="9143538" cy="4114800"/>
+            <a:off x="684212" y="1981200"/>
+            <a:ext cx="4724400" cy="3543300"/>
           </a:xfrm>
+          <a:prstGeom prst="rect">
+            <a:avLst/>
+          </a:prstGeom>
         </p:spPr>
-        <p:txBody>
-          <a:bodyPr/>
-          <a:lstStyle/>
-          <a:p>
-            <a:endParaRPr lang="en-US"/>
-          </a:p>
-        </p:txBody>
-      </p:sp>
+      </p:pic>
+      <p:pic>
+        <p:nvPicPr>
+          <p:cNvPr id="11" name="Picture 10"/>
+          <p:cNvPicPr>
+            <a:picLocks noChangeAspect="1"/>
+          </p:cNvPicPr>
+          <p:nvPr/>
+        </p:nvPicPr>
+        <p:blipFill>
+          <a:blip r:embed="rId3">
+            <a:extLst>
+              <a:ext uri="{28A0092B-C50C-407E-A947-70E740481C1C}">
+                <a14:useLocalDpi xmlns:a14="http://schemas.microsoft.com/office/drawing/2010/main" val="0"/>
+              </a:ext>
+            </a:extLst>
+          </a:blip>
+          <a:stretch>
+            <a:fillRect/>
+          </a:stretch>
+        </p:blipFill>
+        <p:spPr>
+          <a:xfrm>
+            <a:off x="6094412" y="1981200"/>
+            <a:ext cx="4724400" cy="3543300"/>
+          </a:xfrm>
+          <a:prstGeom prst="rect">
+            <a:avLst/>
+          </a:prstGeom>
+        </p:spPr>
+      </p:pic>
     </p:spTree>
     <p:extLst>
       <p:ext uri="{BB962C8B-B14F-4D97-AF65-F5344CB8AC3E}">
@@ -6930,13 +6714,8 @@
           <a:p>
             <a:r>
               <a:rPr lang="en-US" dirty="0"/>
-              <a:t>Snapshots taken at </a:t>
-            </a:r>
-            <a:r>
-              <a:rPr lang="en-US" dirty="0" smtClean="0"/>
-              <a:t>equally spaced steps</a:t>
-            </a:r>
-            <a:endParaRPr lang="en-US" dirty="0"/>
+              <a:t>Snapshots taken at equally spaced steps</a:t>
+            </a:r>
           </a:p>
         </p:txBody>
       </p:sp>
@@ -6992,13 +6771,6 @@
       </p:transition>
     </mc:Fallback>
   </mc:AlternateContent>
-  <p:timing>
-    <p:tnLst>
-      <p:par>
-        <p:cTn id="1" dur="indefinite" restart="never" nodeType="tmRoot"/>
-      </p:par>
-    </p:tnLst>
-  </p:timing>
 </p:sld>
 </file>
 
@@ -7063,13 +6835,6 @@
       </p:transition>
     </mc:Fallback>
   </mc:AlternateContent>
-  <p:timing>
-    <p:tnLst>
-      <p:par>
-        <p:cTn id="1" dur="indefinite" restart="never" nodeType="tmRoot"/>
-      </p:par>
-    </p:tnLst>
-  </p:timing>
 </p:sld>
 </file>
 
@@ -7143,10 +6908,9 @@
           <a:lstStyle/>
           <a:p>
             <a:r>
-              <a:rPr lang="en-US" sz="2800" b="1" dirty="0" smtClean="0"/>
+              <a:rPr lang="en-US" sz="2800" b="1" dirty="0"/>
               <a:t>Occupation probability:</a:t>
             </a:r>
-            <a:endParaRPr lang="en-US" sz="2800" b="1" dirty="0"/>
           </a:p>
         </p:txBody>
       </p:sp>
@@ -7195,7 +6959,7 @@
             </p:spPr>
             <p:txBody>
               <a:bodyPr vert="horz" lIns="91440" tIns="45720" rIns="91440" bIns="45720" rtlCol="0" anchor="t">
-                <a:normAutofit fontScale="92500" lnSpcReduction="20000"/>
+                <a:normAutofit fontScale="92500" lnSpcReduction="10000"/>
               </a:bodyPr>
               <a:lstStyle>
                 <a:lvl1pPr marL="0" indent="0" algn="l" defTabSz="914400" rtl="0" eaLnBrk="1" latinLnBrk="0" hangingPunct="1">
@@ -7415,12 +7179,12 @@
               </a:lstStyle>
               <a:p>
                 <a:r>
-                  <a:rPr lang="en-US" sz="2800" b="1" dirty="0" smtClean="0"/>
+                  <a:rPr lang="en-US" sz="2800" b="1" dirty="0"/>
                   <a:t>Critical probability:</a:t>
                 </a:r>
               </a:p>
               <a:p>
-                <a:endParaRPr lang="en-US" sz="2800" b="1" dirty="0" smtClean="0"/>
+                <a:endParaRPr lang="en-US" sz="2800" b="1" dirty="0"/>
               </a:p>
               <a:p>
                 <a:pPr marL="342900" indent="-342900">
@@ -7428,7 +7192,7 @@
                   <a:buChar char="•"/>
                 </a:pPr>
                 <a:r>
-                  <a:rPr lang="en-US" dirty="0" smtClean="0"/>
+                  <a:rPr lang="en-US" dirty="0"/>
                   <a:t>First time spanning cluster appears</a:t>
                 </a:r>
               </a:p>
@@ -7437,7 +7201,7 @@
                   <a:buFont typeface="Arial" charset="0"/>
                   <a:buChar char="•"/>
                 </a:pPr>
-                <a:endParaRPr lang="en-US" dirty="0" smtClean="0"/>
+                <a:endParaRPr lang="en-US" dirty="0"/>
               </a:p>
               <a:p>
                 <a:pPr marL="342900" indent="-342900">
@@ -7445,7 +7209,7 @@
                   <a:buChar char="•"/>
                 </a:pPr>
                 <a:r>
-                  <a:rPr lang="en-US" dirty="0" smtClean="0"/>
+                  <a:rPr lang="en-US" dirty="0"/>
                   <a:t>For infinite lattice: </a:t>
                 </a:r>
                 <a14:m>
@@ -7454,7 +7218,7 @@
                       <m:sSubPr>
                         <m:ctrlPr>
                           <a:rPr lang="en-US" b="0" i="1" smtClean="0">
-                            <a:latin typeface="Cambria Math" charset="0"/>
+                            <a:latin typeface="Cambria Math" panose="02040503050406030204" pitchFamily="18" charset="0"/>
                           </a:rPr>
                         </m:ctrlPr>
                       </m:sSubPr>
@@ -7505,10 +7269,10 @@
               <a:prstGeom prst="rect">
                 <a:avLst/>
               </a:prstGeom>
-              <a:blipFill rotWithShape="0">
+              <a:blipFill>
                 <a:blip r:embed="rId4"/>
                 <a:stretch>
-                  <a:fillRect l="-2195" t="-10781" b="-4089"/>
+                  <a:fillRect l="-2195" t="-7435" b="-1487"/>
                 </a:stretch>
               </a:blipFill>
             </p:spPr>

</xml_diff>